<commit_message>
Created second branch commit
</commit_message>
<xml_diff>
--- a/The Write Way.pptx
+++ b/The Write Way.pptx
@@ -3002,7 +3002,7 @@
         <p:spPr>
           <a:xfrm>
             <a:off x="11401560" y="6229800"/>
-            <a:ext cx="456120" cy="456120"/>
+            <a:ext cx="455760" cy="455760"/>
           </a:xfrm>
           <a:prstGeom prst="ellipse">
             <a:avLst/>
@@ -3031,7 +3031,7 @@
         <p:spPr>
           <a:xfrm>
             <a:off x="11431080" y="6258960"/>
-            <a:ext cx="397800" cy="397800"/>
+            <a:ext cx="397440" cy="397440"/>
           </a:xfrm>
           <a:prstGeom prst="ellipse">
             <a:avLst/>
@@ -3060,7 +3060,7 @@
         <p:spPr>
           <a:xfrm>
             <a:off x="920880" y="1347120"/>
-            <a:ext cx="10221840" cy="79560"/>
+            <a:ext cx="10221480" cy="79200"/>
           </a:xfrm>
           <a:prstGeom prst="rect">
             <a:avLst/>
@@ -3097,7 +3097,7 @@
         <p:spPr>
           <a:xfrm>
             <a:off x="920880" y="4299840"/>
-            <a:ext cx="10221840" cy="79560"/>
+            <a:ext cx="10221480" cy="79200"/>
           </a:xfrm>
           <a:prstGeom prst="rect">
             <a:avLst/>
@@ -3134,7 +3134,7 @@
         <p:spPr>
           <a:xfrm>
             <a:off x="920880" y="1484640"/>
-            <a:ext cx="10221840" cy="2742120"/>
+            <a:ext cx="10221480" cy="2741760"/>
           </a:xfrm>
           <a:prstGeom prst="rect">
             <a:avLst/>
@@ -3171,7 +3171,7 @@
         <p:spPr>
           <a:xfrm>
             <a:off x="9649080" y="4069080"/>
-            <a:ext cx="1080000" cy="1080000"/>
+            <a:ext cx="1079640" cy="1079640"/>
           </a:xfrm>
           <a:prstGeom prst="ellipse">
             <a:avLst/>
@@ -3200,7 +3200,7 @@
         <p:spPr>
           <a:xfrm>
             <a:off x="9757440" y="4177080"/>
-            <a:ext cx="863640" cy="863640"/>
+            <a:ext cx="863280" cy="863280"/>
           </a:xfrm>
           <a:prstGeom prst="ellipse">
             <a:avLst/>
@@ -3233,7 +3233,7 @@
         <p:spPr>
           <a:xfrm>
             <a:off x="609480" y="273600"/>
-            <a:ext cx="10972080" cy="1144440"/>
+            <a:ext cx="10972440" cy="1144800"/>
           </a:xfrm>
           <a:prstGeom prst="rect">
             <a:avLst/>
@@ -3243,6 +3243,20 @@
           <a:bodyPr lIns="0" rIns="0" tIns="0" bIns="0" anchor="ctr"/>
           <a:p>
             <a:pPr algn="ctr"/>
+            <a:r>
+              <a:rPr b="0" lang="en-IN" sz="4400" spc="-1" strike="noStrike">
+                <a:solidFill>
+                  <a:srgbClr val="000000"/>
+                </a:solidFill>
+                <a:uFill>
+                  <a:solidFill>
+                    <a:srgbClr val="ffffff"/>
+                  </a:solidFill>
+                </a:uFill>
+                <a:latin typeface="Arial"/>
+              </a:rPr>
+              <a:t>Click to edit the title text format</a:t>
+            </a:r>
             <a:endParaRPr b="0" lang="en-IN" sz="4400" spc="-1" strike="noStrike">
               <a:solidFill>
                 <a:srgbClr val="000000"/>
@@ -3270,7 +3284,7 @@
         <p:spPr>
           <a:xfrm>
             <a:off x="609480" y="1604520"/>
-            <a:ext cx="10972080" cy="3976920"/>
+            <a:ext cx="10972440" cy="3977280"/>
           </a:xfrm>
           <a:prstGeom prst="rect">
             <a:avLst/>
@@ -3288,7 +3302,7 @@
               <a:buChar char=""/>
             </a:pPr>
             <a:r>
-              <a:rPr b="0" lang="en-IN" sz="1800" spc="-1" strike="noStrike">
+              <a:rPr b="0" lang="en-IN" sz="3200" spc="-1" strike="noStrike">
                 <a:solidFill>
                   <a:srgbClr val="000000"/>
                 </a:solidFill>
@@ -3301,7 +3315,7 @@
               </a:rPr>
               <a:t>Click to edit the outline text format</a:t>
             </a:r>
-            <a:endParaRPr b="0" lang="en-IN" sz="1800" spc="-1" strike="noStrike">
+            <a:endParaRPr b="0" lang="en-IN" sz="3200" spc="-1" strike="noStrike">
               <a:solidFill>
                 <a:srgbClr val="000000"/>
               </a:solidFill>
@@ -3323,7 +3337,7 @@
               <a:buChar char=""/>
             </a:pPr>
             <a:r>
-              <a:rPr b="0" lang="en-IN" sz="1800" spc="-1" strike="noStrike">
+              <a:rPr b="0" lang="en-IN" sz="2800" spc="-1" strike="noStrike">
                 <a:solidFill>
                   <a:srgbClr val="000000"/>
                 </a:solidFill>
@@ -3336,7 +3350,7 @@
               </a:rPr>
               <a:t>Second Outline Level</a:t>
             </a:r>
-            <a:endParaRPr b="0" lang="en-IN" sz="1800" spc="-1" strike="noStrike">
+            <a:endParaRPr b="0" lang="en-IN" sz="2800" spc="-1" strike="noStrike">
               <a:solidFill>
                 <a:srgbClr val="000000"/>
               </a:solidFill>
@@ -3358,7 +3372,7 @@
               <a:buChar char=""/>
             </a:pPr>
             <a:r>
-              <a:rPr b="0" lang="en-IN" sz="1800" spc="-1" strike="noStrike">
+              <a:rPr b="0" lang="en-IN" sz="2400" spc="-1" strike="noStrike">
                 <a:solidFill>
                   <a:srgbClr val="000000"/>
                 </a:solidFill>
@@ -3371,7 +3385,7 @@
               </a:rPr>
               <a:t>Third Outline Level</a:t>
             </a:r>
-            <a:endParaRPr b="0" lang="en-IN" sz="1800" spc="-1" strike="noStrike">
+            <a:endParaRPr b="0" lang="en-IN" sz="2400" spc="-1" strike="noStrike">
               <a:solidFill>
                 <a:srgbClr val="000000"/>
               </a:solidFill>
@@ -3393,7 +3407,7 @@
               <a:buChar char=""/>
             </a:pPr>
             <a:r>
-              <a:rPr b="0" lang="en-IN" sz="1800" spc="-1" strike="noStrike">
+              <a:rPr b="0" lang="en-IN" sz="2000" spc="-1" strike="noStrike">
                 <a:solidFill>
                   <a:srgbClr val="000000"/>
                 </a:solidFill>
@@ -3406,7 +3420,7 @@
               </a:rPr>
               <a:t>Fourth Outline Level</a:t>
             </a:r>
-            <a:endParaRPr b="0" lang="en-IN" sz="1800" spc="-1" strike="noStrike">
+            <a:endParaRPr b="0" lang="en-IN" sz="2000" spc="-1" strike="noStrike">
               <a:solidFill>
                 <a:srgbClr val="000000"/>
               </a:solidFill>
@@ -3428,7 +3442,7 @@
               <a:buChar char=""/>
             </a:pPr>
             <a:r>
-              <a:rPr b="0" lang="en-IN" sz="1800" spc="-1" strike="noStrike">
+              <a:rPr b="0" lang="en-IN" sz="2000" spc="-1" strike="noStrike">
                 <a:solidFill>
                   <a:srgbClr val="000000"/>
                 </a:solidFill>
@@ -3441,7 +3455,7 @@
               </a:rPr>
               <a:t>Fifth Outline Level</a:t>
             </a:r>
-            <a:endParaRPr b="0" lang="en-IN" sz="1800" spc="-1" strike="noStrike">
+            <a:endParaRPr b="0" lang="en-IN" sz="2000" spc="-1" strike="noStrike">
               <a:solidFill>
                 <a:srgbClr val="000000"/>
               </a:solidFill>
@@ -3463,7 +3477,7 @@
               <a:buChar char=""/>
             </a:pPr>
             <a:r>
-              <a:rPr b="0" lang="en-IN" sz="1800" spc="-1" strike="noStrike">
+              <a:rPr b="0" lang="en-IN" sz="2000" spc="-1" strike="noStrike">
                 <a:solidFill>
                   <a:srgbClr val="000000"/>
                 </a:solidFill>
@@ -3476,7 +3490,7 @@
               </a:rPr>
               <a:t>Sixth Outline Level</a:t>
             </a:r>
-            <a:endParaRPr b="0" lang="en-IN" sz="1800" spc="-1" strike="noStrike">
+            <a:endParaRPr b="0" lang="en-IN" sz="2000" spc="-1" strike="noStrike">
               <a:solidFill>
                 <a:srgbClr val="000000"/>
               </a:solidFill>
@@ -3498,7 +3512,7 @@
               <a:buChar char=""/>
             </a:pPr>
             <a:r>
-              <a:rPr b="0" lang="en-IN" sz="1800" spc="-1" strike="noStrike">
+              <a:rPr b="0" lang="en-IN" sz="2000" spc="-1" strike="noStrike">
                 <a:solidFill>
                   <a:srgbClr val="000000"/>
                 </a:solidFill>
@@ -3511,7 +3525,7 @@
               </a:rPr>
               <a:t>Seventh Outline Level</a:t>
             </a:r>
-            <a:endParaRPr b="0" lang="en-IN" sz="1800" spc="-1" strike="noStrike">
+            <a:endParaRPr b="0" lang="en-IN" sz="2000" spc="-1" strike="noStrike">
               <a:solidFill>
                 <a:srgbClr val="000000"/>
               </a:solidFill>
@@ -3578,7 +3592,7 @@
         <p:spPr>
           <a:xfrm>
             <a:off x="11401560" y="6229800"/>
-            <a:ext cx="456120" cy="456120"/>
+            <a:ext cx="455760" cy="455760"/>
           </a:xfrm>
           <a:prstGeom prst="ellipse">
             <a:avLst/>
@@ -3607,7 +3621,7 @@
         <p:spPr>
           <a:xfrm>
             <a:off x="11431080" y="6258960"/>
-            <a:ext cx="397800" cy="397800"/>
+            <a:ext cx="397440" cy="397440"/>
           </a:xfrm>
           <a:prstGeom prst="ellipse">
             <a:avLst/>
@@ -3992,7 +4006,7 @@
         <p:spPr>
           <a:xfrm>
             <a:off x="915120" y="1353600"/>
-            <a:ext cx="10370880" cy="3034800"/>
+            <a:ext cx="10370520" cy="3034440"/>
           </a:xfrm>
           <a:prstGeom prst="rect">
             <a:avLst/>
@@ -4056,7 +4070,7 @@
         <p:spPr>
           <a:xfrm>
             <a:off x="1069920" y="4389120"/>
-            <a:ext cx="7890120" cy="1068840"/>
+            <a:ext cx="7889760" cy="1068480"/>
           </a:xfrm>
           <a:prstGeom prst="rect">
             <a:avLst/>
@@ -4218,7 +4232,7 @@
         <p:spPr>
           <a:xfrm>
             <a:off x="1069920" y="484560"/>
-            <a:ext cx="10057320" cy="1608120"/>
+            <a:ext cx="10056960" cy="1607760"/>
           </a:xfrm>
           <a:prstGeom prst="rect">
             <a:avLst/>
@@ -4280,7 +4294,7 @@
         <p:spPr>
           <a:xfrm>
             <a:off x="1069920" y="2121480"/>
-            <a:ext cx="10057320" cy="4049640"/>
+            <a:ext cx="10056960" cy="4049280"/>
           </a:xfrm>
           <a:prstGeom prst="rect">
             <a:avLst/>
@@ -4442,7 +4456,7 @@
         <p:spPr>
           <a:xfrm>
             <a:off x="1069920" y="484560"/>
-            <a:ext cx="10057320" cy="1608120"/>
+            <a:ext cx="10056960" cy="1607760"/>
           </a:xfrm>
           <a:prstGeom prst="rect">
             <a:avLst/>
@@ -4504,7 +4518,7 @@
         <p:spPr>
           <a:xfrm>
             <a:off x="1069920" y="2121480"/>
-            <a:ext cx="10057320" cy="4049640"/>
+            <a:ext cx="10056960" cy="4049280"/>
           </a:xfrm>
           <a:prstGeom prst="rect">
             <a:avLst/>
@@ -4523,7 +4537,7 @@
         <p:txBody>
           <a:bodyPr lIns="90000" rIns="90000" tIns="45000" bIns="45000"/>
           <a:p>
-            <a:pPr marL="182880" indent="-181800">
+            <a:pPr marL="182880" indent="-181440">
               <a:lnSpc>
                 <a:spcPct val="90000"/>
               </a:lnSpc>
@@ -4592,7 +4606,7 @@
             </a:endParaRPr>
           </a:p>
           <a:p>
-            <a:pPr marL="182880" indent="-181800">
+            <a:pPr marL="182880" indent="-181440">
               <a:lnSpc>
                 <a:spcPct val="90000"/>
               </a:lnSpc>
@@ -4676,7 +4690,7 @@
             </a:endParaRPr>
           </a:p>
           <a:p>
-            <a:pPr marL="182880" indent="-181800">
+            <a:pPr marL="182880" indent="-181440">
               <a:lnSpc>
                 <a:spcPct val="90000"/>
               </a:lnSpc>
@@ -4745,7 +4759,7 @@
             </a:endParaRPr>
           </a:p>
           <a:p>
-            <a:pPr marL="182880" indent="-181800">
+            <a:pPr marL="182880" indent="-181440">
               <a:lnSpc>
                 <a:spcPct val="90000"/>
               </a:lnSpc>
@@ -4954,7 +4968,7 @@
         <p:spPr>
           <a:xfrm>
             <a:off x="1069920" y="484560"/>
-            <a:ext cx="10057320" cy="1608120"/>
+            <a:ext cx="10056960" cy="1607760"/>
           </a:xfrm>
           <a:prstGeom prst="rect">
             <a:avLst/>
@@ -5016,7 +5030,7 @@
         <p:spPr>
           <a:xfrm>
             <a:off x="1069920" y="2121480"/>
-            <a:ext cx="10057320" cy="4049640"/>
+            <a:ext cx="10056960" cy="4049280"/>
           </a:xfrm>
           <a:prstGeom prst="rect">
             <a:avLst/>
@@ -5035,7 +5049,7 @@
         <p:txBody>
           <a:bodyPr lIns="90000" rIns="90000" tIns="45000" bIns="45000"/>
           <a:p>
-            <a:pPr marL="182880" indent="-181800">
+            <a:pPr marL="182880" indent="-181440">
               <a:lnSpc>
                 <a:spcPct val="90000"/>
               </a:lnSpc>
@@ -5092,7 +5106,7 @@
             </a:endParaRPr>
           </a:p>
           <a:p>
-            <a:pPr marL="182880" indent="-181800">
+            <a:pPr marL="182880" indent="-181440">
               <a:lnSpc>
                 <a:spcPct val="90000"/>
               </a:lnSpc>
@@ -5149,7 +5163,7 @@
             </a:endParaRPr>
           </a:p>
           <a:p>
-            <a:pPr marL="182880" indent="-181800">
+            <a:pPr marL="182880" indent="-181440">
               <a:lnSpc>
                 <a:spcPct val="90000"/>
               </a:lnSpc>
@@ -5206,7 +5220,7 @@
             </a:endParaRPr>
           </a:p>
           <a:p>
-            <a:pPr marL="182880" indent="-181800">
+            <a:pPr marL="182880" indent="-181440">
               <a:lnSpc>
                 <a:spcPct val="90000"/>
               </a:lnSpc>
@@ -5322,7 +5336,7 @@
         <p:spPr>
           <a:xfrm>
             <a:off x="1069920" y="484560"/>
-            <a:ext cx="10057320" cy="1608120"/>
+            <a:ext cx="10056960" cy="1607760"/>
           </a:xfrm>
           <a:prstGeom prst="rect">
             <a:avLst/>
@@ -5384,7 +5398,7 @@
         <p:spPr>
           <a:xfrm>
             <a:off x="1069920" y="2121480"/>
-            <a:ext cx="10057320" cy="4049640"/>
+            <a:ext cx="10056960" cy="4049280"/>
           </a:xfrm>
           <a:prstGeom prst="rect">
             <a:avLst/>
@@ -5403,7 +5417,7 @@
         <p:txBody>
           <a:bodyPr lIns="90000" rIns="90000" tIns="45000" bIns="45000"/>
           <a:p>
-            <a:pPr marL="182880" indent="-181800">
+            <a:pPr marL="182880" indent="-181440">
               <a:lnSpc>
                 <a:spcPct val="90000"/>
               </a:lnSpc>
@@ -5519,7 +5533,7 @@
         <p:spPr>
           <a:xfrm>
             <a:off x="1069920" y="484560"/>
-            <a:ext cx="10057320" cy="1608120"/>
+            <a:ext cx="10056960" cy="1607760"/>
           </a:xfrm>
           <a:prstGeom prst="rect">
             <a:avLst/>
@@ -5581,7 +5595,7 @@
         <p:spPr>
           <a:xfrm>
             <a:off x="1069920" y="2121480"/>
-            <a:ext cx="10057320" cy="4049640"/>
+            <a:ext cx="10056960" cy="4049280"/>
           </a:xfrm>
           <a:prstGeom prst="rect">
             <a:avLst/>
@@ -5692,7 +5706,7 @@
         <p:spPr>
           <a:xfrm>
             <a:off x="1069920" y="484560"/>
-            <a:ext cx="10057320" cy="1608120"/>
+            <a:ext cx="10056960" cy="1607760"/>
           </a:xfrm>
           <a:prstGeom prst="rect">
             <a:avLst/>
@@ -5754,7 +5768,7 @@
         <p:spPr>
           <a:xfrm>
             <a:off x="1069920" y="2121480"/>
-            <a:ext cx="10057320" cy="4049640"/>
+            <a:ext cx="10056960" cy="4049280"/>
           </a:xfrm>
           <a:prstGeom prst="rect">
             <a:avLst/>
@@ -5773,7 +5787,7 @@
         <p:txBody>
           <a:bodyPr lIns="90000" rIns="90000" tIns="45000" bIns="45000"/>
           <a:p>
-            <a:pPr marL="182880" indent="-181800">
+            <a:pPr marL="182880" indent="-181440">
               <a:lnSpc>
                 <a:spcPct val="90000"/>
               </a:lnSpc>
@@ -5812,7 +5826,7 @@
             </a:endParaRPr>
           </a:p>
           <a:p>
-            <a:pPr marL="182880" indent="-181800">
+            <a:pPr marL="182880" indent="-181440">
               <a:lnSpc>
                 <a:spcPct val="90000"/>
               </a:lnSpc>
@@ -5851,7 +5865,7 @@
             </a:endParaRPr>
           </a:p>
           <a:p>
-            <a:pPr marL="182880" indent="-181800">
+            <a:pPr marL="182880" indent="-181440">
               <a:lnSpc>
                 <a:spcPct val="90000"/>
               </a:lnSpc>
@@ -5890,7 +5904,7 @@
             </a:endParaRPr>
           </a:p>
           <a:p>
-            <a:pPr marL="182880" indent="-181800">
+            <a:pPr marL="182880" indent="-181440">
               <a:lnSpc>
                 <a:spcPct val="90000"/>
               </a:lnSpc>
@@ -6006,7 +6020,7 @@
         <p:spPr>
           <a:xfrm>
             <a:off x="1069920" y="484560"/>
-            <a:ext cx="10057320" cy="1608120"/>
+            <a:ext cx="10056960" cy="1607760"/>
           </a:xfrm>
           <a:prstGeom prst="rect">
             <a:avLst/>
@@ -6068,7 +6082,7 @@
         <p:spPr>
           <a:xfrm>
             <a:off x="1069920" y="2121480"/>
-            <a:ext cx="10057320" cy="4049640"/>
+            <a:ext cx="10056960" cy="4049280"/>
           </a:xfrm>
           <a:prstGeom prst="rect">
             <a:avLst/>
@@ -6087,7 +6101,7 @@
         <p:txBody>
           <a:bodyPr lIns="90000" rIns="90000" tIns="45000" bIns="45000"/>
           <a:p>
-            <a:pPr marL="432000" indent="-323280">
+            <a:pPr marL="432000" indent="-322920">
               <a:lnSpc>
                 <a:spcPct val="100000"/>
               </a:lnSpc>
@@ -6185,7 +6199,7 @@
         <p:spPr>
           <a:xfrm>
             <a:off x="1069920" y="484560"/>
-            <a:ext cx="10057320" cy="1608120"/>
+            <a:ext cx="10056960" cy="1607760"/>
           </a:xfrm>
           <a:prstGeom prst="rect">
             <a:avLst/>
@@ -6247,7 +6261,7 @@
         <p:spPr>
           <a:xfrm>
             <a:off x="1069920" y="2121480"/>
-            <a:ext cx="10057320" cy="4049640"/>
+            <a:ext cx="10056960" cy="4049280"/>
           </a:xfrm>
           <a:prstGeom prst="rect">
             <a:avLst/>
@@ -6266,7 +6280,7 @@
         <p:txBody>
           <a:bodyPr lIns="90000" rIns="90000" tIns="45000" bIns="45000"/>
           <a:p>
-            <a:pPr marL="432000" indent="-323280">
+            <a:pPr marL="432000" indent="-322920">
               <a:lnSpc>
                 <a:spcPct val="100000"/>
               </a:lnSpc>
@@ -6305,7 +6319,7 @@
             </a:endParaRPr>
           </a:p>
           <a:p>
-            <a:pPr marL="432000" indent="-323280">
+            <a:pPr marL="432000" indent="-322920">
               <a:lnSpc>
                 <a:spcPct val="100000"/>
               </a:lnSpc>

</xml_diff>